<commit_message>
Add UI to adjust the weights
</commit_message>
<xml_diff>
--- a/doc/8.現状の成果.pptx
+++ b/doc/8.現状の成果.pptx
@@ -7,6 +7,9 @@
   <p:sldIdLst>
     <p:sldId id="256" r:id="rId2"/>
     <p:sldId id="257" r:id="rId3"/>
+    <p:sldId id="258" r:id="rId4"/>
+    <p:sldId id="259" r:id="rId5"/>
+    <p:sldId id="260" r:id="rId6"/>
   </p:sldIdLst>
   <p:sldSz cx="9144000" cy="6858000" type="screen4x3"/>
   <p:notesSz cx="6858000" cy="9144000"/>
@@ -3132,10 +3135,400 @@
           <a:chExt cx="0" cy="0"/>
         </a:xfrm>
       </p:grpSpPr>
+      <p:pic>
+        <p:nvPicPr>
+          <p:cNvPr id="1026" name="Picture 2"/>
+          <p:cNvPicPr>
+            <a:picLocks noChangeAspect="1" noChangeArrowheads="1"/>
+          </p:cNvPicPr>
+          <p:nvPr/>
+        </p:nvPicPr>
+        <p:blipFill>
+          <a:blip r:embed="rId2">
+            <a:extLst>
+              <a:ext uri="{28A0092B-C50C-407E-A947-70E740481C1C}">
+                <a14:useLocalDpi xmlns:a14="http://schemas.microsoft.com/office/drawing/2010/main" val="0"/>
+              </a:ext>
+            </a:extLst>
+          </a:blip>
+          <a:srcRect/>
+          <a:stretch>
+            <a:fillRect/>
+          </a:stretch>
+        </p:blipFill>
+        <p:spPr bwMode="auto">
+          <a:xfrm>
+            <a:off x="1" y="1056088"/>
+            <a:ext cx="9144000" cy="5801912"/>
+          </a:xfrm>
+          <a:prstGeom prst="rect">
+            <a:avLst/>
+          </a:prstGeom>
+          <a:noFill/>
+          <a:ln>
+            <a:noFill/>
+          </a:ln>
+          <a:extLst>
+            <a:ext uri="{909E8E84-426E-40DD-AFC4-6F175D3DCCD1}">
+              <a14:hiddenFill xmlns:a14="http://schemas.microsoft.com/office/drawing/2010/main">
+                <a:solidFill>
+                  <a:schemeClr val="accent1"/>
+                </a:solidFill>
+              </a14:hiddenFill>
+            </a:ext>
+            <a:ext uri="{91240B29-F687-4F45-9708-019B960494DF}">
+              <a14:hiddenLine xmlns:a14="http://schemas.microsoft.com/office/drawing/2010/main" w="9525">
+                <a:solidFill>
+                  <a:schemeClr val="tx1"/>
+                </a:solidFill>
+                <a:miter lim="800000"/>
+                <a:headEnd/>
+                <a:tailEnd/>
+              </a14:hiddenLine>
+            </a:ext>
+          </a:extLst>
+        </p:spPr>
+      </p:pic>
+      <p:sp>
+        <p:nvSpPr>
+          <p:cNvPr id="2" name="TextBox 1"/>
+          <p:cNvSpPr txBox="1"/>
+          <p:nvPr/>
+        </p:nvSpPr>
+        <p:spPr>
+          <a:xfrm>
+            <a:off x="1" y="0"/>
+            <a:ext cx="9144000" cy="646331"/>
+          </a:xfrm>
+          <a:prstGeom prst="rect">
+            <a:avLst/>
+          </a:prstGeom>
+          <a:noFill/>
+        </p:spPr>
+        <p:txBody>
+          <a:bodyPr wrap="square" rtlCol="0">
+            <a:spAutoFit/>
+          </a:bodyPr>
+          <a:lstStyle/>
+          <a:p>
+            <a:r>
+              <a:rPr lang="ja-JP" altLang="en-US" dirty="0"/>
+              <a:t>サンフランシス</a:t>
+            </a:r>
+            <a:r>
+              <a:rPr lang="ja-JP" altLang="en-US" dirty="0" smtClean="0"/>
+              <a:t>コの</a:t>
+            </a:r>
+            <a:r>
+              <a:rPr lang="en-US" altLang="ja-JP" dirty="0" smtClean="0"/>
+              <a:t>area</a:t>
+            </a:r>
+            <a:r>
+              <a:rPr lang="ja-JP" altLang="en-US" dirty="0" smtClean="0"/>
+              <a:t>を使って、</a:t>
+            </a:r>
+            <a:r>
+              <a:rPr lang="en-US" altLang="ja-JP" dirty="0" smtClean="0"/>
+              <a:t>kde_feature_new-york1.xml</a:t>
+            </a:r>
+            <a:r>
+              <a:rPr lang="ja-JP" altLang="en-US" dirty="0" smtClean="0"/>
+              <a:t>を左上、</a:t>
+            </a:r>
+            <a:r>
+              <a:rPr lang="en-US" altLang="ja-JP" dirty="0" smtClean="0"/>
+              <a:t>kde_feature_new-york2.xml</a:t>
+            </a:r>
+            <a:r>
+              <a:rPr lang="ja-JP" altLang="en-US" dirty="0" smtClean="0"/>
+              <a:t>を右下に</a:t>
+            </a:r>
+            <a:r>
+              <a:rPr lang="en-US" altLang="ja-JP" dirty="0" smtClean="0"/>
+              <a:t>populate</a:t>
+            </a:r>
+            <a:r>
+              <a:rPr lang="ja-JP" altLang="en-US" dirty="0" smtClean="0"/>
+              <a:t>した結果。</a:t>
+            </a:r>
+            <a:endParaRPr lang="en-US" dirty="0"/>
+          </a:p>
+        </p:txBody>
+      </p:sp>
     </p:spTree>
     <p:extLst>
       <p:ext uri="{BB962C8B-B14F-4D97-AF65-F5344CB8AC3E}">
         <p14:creationId xmlns:p14="http://schemas.microsoft.com/office/powerpoint/2010/main" val="2811925470"/>
+      </p:ext>
+    </p:extLst>
+  </p:cSld>
+  <p:clrMapOvr>
+    <a:masterClrMapping/>
+  </p:clrMapOvr>
+</p:sld>
+</file>
+
+<file path=ppt/slides/slide3.xml><?xml version="1.0" encoding="utf-8"?>
+<p:sld xmlns:a="http://schemas.openxmlformats.org/drawingml/2006/main" xmlns:r="http://schemas.openxmlformats.org/officeDocument/2006/relationships" xmlns:p="http://schemas.openxmlformats.org/presentationml/2006/main">
+  <p:cSld>
+    <p:spTree>
+      <p:nvGrpSpPr>
+        <p:cNvPr id="1" name=""/>
+        <p:cNvGrpSpPr/>
+        <p:nvPr/>
+      </p:nvGrpSpPr>
+      <p:grpSpPr>
+        <a:xfrm>
+          <a:off x="0" y="0"/>
+          <a:ext cx="0" cy="0"/>
+          <a:chOff x="0" y="0"/>
+          <a:chExt cx="0" cy="0"/>
+        </a:xfrm>
+      </p:grpSpPr>
+      <p:pic>
+        <p:nvPicPr>
+          <p:cNvPr id="2050" name="Picture 2"/>
+          <p:cNvPicPr>
+            <a:picLocks noChangeAspect="1" noChangeArrowheads="1"/>
+          </p:cNvPicPr>
+          <p:nvPr/>
+        </p:nvPicPr>
+        <p:blipFill>
+          <a:blip r:embed="rId2">
+            <a:extLst>
+              <a:ext uri="{28A0092B-C50C-407E-A947-70E740481C1C}">
+                <a14:useLocalDpi xmlns:a14="http://schemas.microsoft.com/office/drawing/2010/main" val="0"/>
+              </a:ext>
+            </a:extLst>
+          </a:blip>
+          <a:srcRect/>
+          <a:stretch>
+            <a:fillRect/>
+          </a:stretch>
+        </p:blipFill>
+        <p:spPr bwMode="auto">
+          <a:xfrm>
+            <a:off x="0" y="935658"/>
+            <a:ext cx="9144000" cy="5922342"/>
+          </a:xfrm>
+          <a:prstGeom prst="rect">
+            <a:avLst/>
+          </a:prstGeom>
+          <a:noFill/>
+          <a:ln>
+            <a:noFill/>
+          </a:ln>
+          <a:extLst>
+            <a:ext uri="{909E8E84-426E-40DD-AFC4-6F175D3DCCD1}">
+              <a14:hiddenFill xmlns:a14="http://schemas.microsoft.com/office/drawing/2010/main">
+                <a:solidFill>
+                  <a:schemeClr val="accent1"/>
+                </a:solidFill>
+              </a14:hiddenFill>
+            </a:ext>
+            <a:ext uri="{91240B29-F687-4F45-9708-019B960494DF}">
+              <a14:hiddenLine xmlns:a14="http://schemas.microsoft.com/office/drawing/2010/main" w="9525">
+                <a:solidFill>
+                  <a:schemeClr val="tx1"/>
+                </a:solidFill>
+                <a:miter lim="800000"/>
+                <a:headEnd/>
+                <a:tailEnd/>
+              </a14:hiddenLine>
+            </a:ext>
+          </a:extLst>
+        </p:spPr>
+      </p:pic>
+      <p:sp>
+        <p:nvSpPr>
+          <p:cNvPr id="3" name="TextBox 2"/>
+          <p:cNvSpPr txBox="1"/>
+          <p:nvPr/>
+        </p:nvSpPr>
+        <p:spPr>
+          <a:xfrm>
+            <a:off x="1" y="0"/>
+            <a:ext cx="9144000" cy="369332"/>
+          </a:xfrm>
+          <a:prstGeom prst="rect">
+            <a:avLst/>
+          </a:prstGeom>
+          <a:noFill/>
+        </p:spPr>
+        <p:txBody>
+          <a:bodyPr wrap="square" rtlCol="0">
+            <a:spAutoFit/>
+          </a:bodyPr>
+          <a:lstStyle/>
+          <a:p>
+            <a:r>
+              <a:rPr lang="en-US" altLang="ja-JP" dirty="0" smtClean="0"/>
+              <a:t>Connect</a:t>
+            </a:r>
+            <a:r>
+              <a:rPr lang="ja-JP" altLang="en-US" dirty="0" smtClean="0"/>
+              <a:t>した結果。</a:t>
+            </a:r>
+            <a:endParaRPr lang="en-US" dirty="0"/>
+          </a:p>
+        </p:txBody>
+      </p:sp>
+    </p:spTree>
+    <p:extLst>
+      <p:ext uri="{BB962C8B-B14F-4D97-AF65-F5344CB8AC3E}">
+        <p14:creationId xmlns:p14="http://schemas.microsoft.com/office/powerpoint/2010/main" val="1695246011"/>
+      </p:ext>
+    </p:extLst>
+  </p:cSld>
+  <p:clrMapOvr>
+    <a:masterClrMapping/>
+  </p:clrMapOvr>
+</p:sld>
+</file>
+
+<file path=ppt/slides/slide4.xml><?xml version="1.0" encoding="utf-8"?>
+<p:sld xmlns:a="http://schemas.openxmlformats.org/drawingml/2006/main" xmlns:r="http://schemas.openxmlformats.org/officeDocument/2006/relationships" xmlns:p="http://schemas.openxmlformats.org/presentationml/2006/main">
+  <p:cSld>
+    <p:spTree>
+      <p:nvGrpSpPr>
+        <p:cNvPr id="1" name=""/>
+        <p:cNvGrpSpPr/>
+        <p:nvPr/>
+      </p:nvGrpSpPr>
+      <p:grpSpPr>
+        <a:xfrm>
+          <a:off x="0" y="0"/>
+          <a:ext cx="0" cy="0"/>
+          <a:chOff x="0" y="0"/>
+          <a:chExt cx="0" cy="0"/>
+        </a:xfrm>
+      </p:grpSpPr>
+      <p:pic>
+        <p:nvPicPr>
+          <p:cNvPr id="3074" name="Picture 2"/>
+          <p:cNvPicPr>
+            <a:picLocks noChangeAspect="1" noChangeArrowheads="1"/>
+          </p:cNvPicPr>
+          <p:nvPr/>
+        </p:nvPicPr>
+        <p:blipFill>
+          <a:blip r:embed="rId2">
+            <a:extLst>
+              <a:ext uri="{28A0092B-C50C-407E-A947-70E740481C1C}">
+                <a14:useLocalDpi xmlns:a14="http://schemas.microsoft.com/office/drawing/2010/main" val="0"/>
+              </a:ext>
+            </a:extLst>
+          </a:blip>
+          <a:srcRect/>
+          <a:stretch>
+            <a:fillRect/>
+          </a:stretch>
+        </p:blipFill>
+        <p:spPr bwMode="auto">
+          <a:xfrm>
+            <a:off x="1771" y="990600"/>
+            <a:ext cx="9142229" cy="5867400"/>
+          </a:xfrm>
+          <a:prstGeom prst="rect">
+            <a:avLst/>
+          </a:prstGeom>
+          <a:noFill/>
+          <a:ln>
+            <a:noFill/>
+          </a:ln>
+          <a:extLst>
+            <a:ext uri="{909E8E84-426E-40DD-AFC4-6F175D3DCCD1}">
+              <a14:hiddenFill xmlns:a14="http://schemas.microsoft.com/office/drawing/2010/main">
+                <a:solidFill>
+                  <a:schemeClr val="accent1"/>
+                </a:solidFill>
+              </a14:hiddenFill>
+            </a:ext>
+            <a:ext uri="{91240B29-F687-4F45-9708-019B960494DF}">
+              <a14:hiddenLine xmlns:a14="http://schemas.microsoft.com/office/drawing/2010/main" w="9525">
+                <a:solidFill>
+                  <a:schemeClr val="tx1"/>
+                </a:solidFill>
+                <a:miter lim="800000"/>
+                <a:headEnd/>
+                <a:tailEnd/>
+              </a14:hiddenLine>
+            </a:ext>
+          </a:extLst>
+        </p:spPr>
+      </p:pic>
+      <p:sp>
+        <p:nvSpPr>
+          <p:cNvPr id="3" name="TextBox 2"/>
+          <p:cNvSpPr txBox="1"/>
+          <p:nvPr/>
+        </p:nvSpPr>
+        <p:spPr>
+          <a:xfrm>
+            <a:off x="1" y="0"/>
+            <a:ext cx="9144000" cy="369332"/>
+          </a:xfrm>
+          <a:prstGeom prst="rect">
+            <a:avLst/>
+          </a:prstGeom>
+          <a:noFill/>
+        </p:spPr>
+        <p:txBody>
+          <a:bodyPr wrap="square" rtlCol="0">
+            <a:spAutoFit/>
+          </a:bodyPr>
+          <a:lstStyle/>
+          <a:p>
+            <a:r>
+              <a:rPr lang="ja-JP" altLang="en-US" dirty="0" smtClean="0"/>
+              <a:t>境界上に</a:t>
+            </a:r>
+            <a:r>
+              <a:rPr lang="en-US" altLang="ja-JP" dirty="0" smtClean="0"/>
+              <a:t>Avenue</a:t>
+            </a:r>
+            <a:r>
+              <a:rPr lang="ja-JP" altLang="en-US" dirty="0" smtClean="0"/>
+              <a:t>を追加した結果。</a:t>
+            </a:r>
+            <a:endParaRPr lang="en-US" dirty="0"/>
+          </a:p>
+        </p:txBody>
+      </p:sp>
+    </p:spTree>
+    <p:extLst>
+      <p:ext uri="{BB962C8B-B14F-4D97-AF65-F5344CB8AC3E}">
+        <p14:creationId xmlns:p14="http://schemas.microsoft.com/office/powerpoint/2010/main" val="3231832407"/>
+      </p:ext>
+    </p:extLst>
+  </p:cSld>
+  <p:clrMapOvr>
+    <a:masterClrMapping/>
+  </p:clrMapOvr>
+</p:sld>
+</file>
+
+<file path=ppt/slides/slide5.xml><?xml version="1.0" encoding="utf-8"?>
+<p:sld xmlns:a="http://schemas.openxmlformats.org/drawingml/2006/main" xmlns:r="http://schemas.openxmlformats.org/officeDocument/2006/relationships" xmlns:p="http://schemas.openxmlformats.org/presentationml/2006/main">
+  <p:cSld>
+    <p:spTree>
+      <p:nvGrpSpPr>
+        <p:cNvPr id="1" name=""/>
+        <p:cNvGrpSpPr/>
+        <p:nvPr/>
+      </p:nvGrpSpPr>
+      <p:grpSpPr>
+        <a:xfrm>
+          <a:off x="0" y="0"/>
+          <a:ext cx="0" cy="0"/>
+          <a:chOff x="0" y="0"/>
+          <a:chExt cx="0" cy="0"/>
+        </a:xfrm>
+      </p:grpSpPr>
+    </p:spTree>
+    <p:extLst>
+      <p:ext uri="{BB962C8B-B14F-4D97-AF65-F5344CB8AC3E}">
+        <p14:creationId xmlns:p14="http://schemas.microsoft.com/office/powerpoint/2010/main" val="4249291487"/>
       </p:ext>
     </p:extLst>
   </p:cSld>

</xml_diff>